<commit_message>
Últimas modificações na página de dicas.
</commit_message>
<xml_diff>
--- a/Documentação/Apresentação-Bible-Learing.pptx
+++ b/Documentação/Apresentação-Bible-Learing.pptx
@@ -209,7 +209,7 @@
           <a:p>
             <a:fld id="{7504E29F-0491-4E9C-A613-95E43F41A428}" type="datetimeFigureOut">
               <a:rPr lang="pt-BR" smtClean="0"/>
-              <a:t>04/06/2022</a:t>
+              <a:t>08/06/2022</a:t>
             </a:fld>
             <a:endParaRPr lang="pt-BR"/>
           </a:p>
@@ -623,7 +623,7 @@
           <a:p>
             <a:fld id="{D0B54099-1084-4C1A-B175-BCECB68A466D}" type="datetimeFigureOut">
               <a:rPr lang="pt-BR" smtClean="0"/>
-              <a:t>04/06/2022</a:t>
+              <a:t>08/06/2022</a:t>
             </a:fld>
             <a:endParaRPr lang="pt-BR"/>
           </a:p>
@@ -821,7 +821,7 @@
           <a:p>
             <a:fld id="{D0B54099-1084-4C1A-B175-BCECB68A466D}" type="datetimeFigureOut">
               <a:rPr lang="pt-BR" smtClean="0"/>
-              <a:t>04/06/2022</a:t>
+              <a:t>08/06/2022</a:t>
             </a:fld>
             <a:endParaRPr lang="pt-BR"/>
           </a:p>
@@ -1029,7 +1029,7 @@
           <a:p>
             <a:fld id="{D0B54099-1084-4C1A-B175-BCECB68A466D}" type="datetimeFigureOut">
               <a:rPr lang="pt-BR" smtClean="0"/>
-              <a:t>04/06/2022</a:t>
+              <a:t>08/06/2022</a:t>
             </a:fld>
             <a:endParaRPr lang="pt-BR"/>
           </a:p>
@@ -1227,7 +1227,7 @@
           <a:p>
             <a:fld id="{D0B54099-1084-4C1A-B175-BCECB68A466D}" type="datetimeFigureOut">
               <a:rPr lang="pt-BR" smtClean="0"/>
-              <a:t>04/06/2022</a:t>
+              <a:t>08/06/2022</a:t>
             </a:fld>
             <a:endParaRPr lang="pt-BR"/>
           </a:p>
@@ -1502,7 +1502,7 @@
           <a:p>
             <a:fld id="{D0B54099-1084-4C1A-B175-BCECB68A466D}" type="datetimeFigureOut">
               <a:rPr lang="pt-BR" smtClean="0"/>
-              <a:t>04/06/2022</a:t>
+              <a:t>08/06/2022</a:t>
             </a:fld>
             <a:endParaRPr lang="pt-BR"/>
           </a:p>
@@ -1767,7 +1767,7 @@
           <a:p>
             <a:fld id="{D0B54099-1084-4C1A-B175-BCECB68A466D}" type="datetimeFigureOut">
               <a:rPr lang="pt-BR" smtClean="0"/>
-              <a:t>04/06/2022</a:t>
+              <a:t>08/06/2022</a:t>
             </a:fld>
             <a:endParaRPr lang="pt-BR"/>
           </a:p>
@@ -2179,7 +2179,7 @@
           <a:p>
             <a:fld id="{D0B54099-1084-4C1A-B175-BCECB68A466D}" type="datetimeFigureOut">
               <a:rPr lang="pt-BR" smtClean="0"/>
-              <a:t>04/06/2022</a:t>
+              <a:t>08/06/2022</a:t>
             </a:fld>
             <a:endParaRPr lang="pt-BR"/>
           </a:p>
@@ -2320,7 +2320,7 @@
           <a:p>
             <a:fld id="{D0B54099-1084-4C1A-B175-BCECB68A466D}" type="datetimeFigureOut">
               <a:rPr lang="pt-BR" smtClean="0"/>
-              <a:t>04/06/2022</a:t>
+              <a:t>08/06/2022</a:t>
             </a:fld>
             <a:endParaRPr lang="pt-BR"/>
           </a:p>
@@ -2433,7 +2433,7 @@
           <a:p>
             <a:fld id="{D0B54099-1084-4C1A-B175-BCECB68A466D}" type="datetimeFigureOut">
               <a:rPr lang="pt-BR" smtClean="0"/>
-              <a:t>04/06/2022</a:t>
+              <a:t>08/06/2022</a:t>
             </a:fld>
             <a:endParaRPr lang="pt-BR"/>
           </a:p>
@@ -2744,7 +2744,7 @@
           <a:p>
             <a:fld id="{D0B54099-1084-4C1A-B175-BCECB68A466D}" type="datetimeFigureOut">
               <a:rPr lang="pt-BR" smtClean="0"/>
-              <a:t>04/06/2022</a:t>
+              <a:t>08/06/2022</a:t>
             </a:fld>
             <a:endParaRPr lang="pt-BR"/>
           </a:p>
@@ -3032,7 +3032,7 @@
           <a:p>
             <a:fld id="{D0B54099-1084-4C1A-B175-BCECB68A466D}" type="datetimeFigureOut">
               <a:rPr lang="pt-BR" smtClean="0"/>
-              <a:t>04/06/2022</a:t>
+              <a:t>08/06/2022</a:t>
             </a:fld>
             <a:endParaRPr lang="pt-BR"/>
           </a:p>
@@ -3273,7 +3273,7 @@
           <a:p>
             <a:fld id="{D0B54099-1084-4C1A-B175-BCECB68A466D}" type="datetimeFigureOut">
               <a:rPr lang="pt-BR" smtClean="0"/>
-              <a:t>04/06/2022</a:t>
+              <a:t>08/06/2022</a:t>
             </a:fld>
             <a:endParaRPr lang="pt-BR"/>
           </a:p>
@@ -3912,7 +3912,7 @@
         </p:nvSpPr>
         <p:spPr>
           <a:xfrm>
-            <a:off x="0" y="602560"/>
+            <a:off x="-1" y="602560"/>
             <a:ext cx="12192000" cy="6272630"/>
           </a:xfrm>
           <a:prstGeom prst="rect">
@@ -6308,13 +6308,13 @@
   <p:clrMapOvr>
     <a:masterClrMapping/>
   </p:clrMapOvr>
-  <mc:AlternateContent xmlns:mc="http://schemas.openxmlformats.org/markup-compatibility/2006">
-    <mc:Choice xmlns:p159="http://schemas.microsoft.com/office/powerpoint/2015/09/main" Requires="p159">
+  <mc:AlternateContent xmlns:mc="http://schemas.openxmlformats.org/markup-compatibility/2006" xmlns:p159="http://schemas.microsoft.com/office/powerpoint/2015/09/main">
+    <mc:Choice Requires="p159">
       <p:transition xmlns:p14="http://schemas.microsoft.com/office/powerpoint/2010/main" spd="slow" p14:dur="2000">
         <p159:morph option="byObject"/>
       </p:transition>
     </mc:Choice>
-    <mc:Fallback>
+    <mc:Fallback xmlns="">
       <p:transition spd="slow">
         <p:fade/>
       </p:transition>
@@ -7603,6 +7603,12 @@
 </file>
 
 <file path=customXml/item2.xml><?xml version="1.0" encoding="utf-8"?>
+<p:properties xmlns:p="http://schemas.microsoft.com/office/2006/metadata/properties" xmlns:xsi="http://www.w3.org/2001/XMLSchema-instance" xmlns:pc="http://schemas.microsoft.com/office/infopath/2007/PartnerControls">
+  <documentManagement/>
+</p:properties>
+</file>
+
+<file path=customXml/item3.xml><?xml version="1.0" encoding="utf-8"?>
 <ct:contentTypeSchema xmlns:ct="http://schemas.microsoft.com/office/2006/metadata/contentType" xmlns:ma="http://schemas.microsoft.com/office/2006/metadata/properties/metaAttributes" ct:_="" ma:_="" ma:contentTypeName="Document" ma:contentTypeID="0x010100CD94351161D70F4CAEBD7B86231B3DDF" ma:contentTypeVersion="12" ma:contentTypeDescription="Create a new document." ma:contentTypeScope="" ma:versionID="03f332ee7f792b734adf761b9ea10702">
   <xsd:schema xmlns:xsd="http://www.w3.org/2001/XMLSchema" xmlns:xs="http://www.w3.org/2001/XMLSchema" xmlns:p="http://schemas.microsoft.com/office/2006/metadata/properties" xmlns:ns3="4bc5c97c-1d73-4ddd-b761-3e2b250dfd29" xmlns:ns4="8531b0eb-b9ec-4304-8fd5-4ef867e31f75" targetNamespace="http://schemas.microsoft.com/office/2006/metadata/properties" ma:root="true" ma:fieldsID="342fe0a34a34461b85a7e83643fa44ba" ns3:_="" ns4:_="">
     <xsd:import namespace="4bc5c97c-1d73-4ddd-b761-3e2b250dfd29"/>
@@ -7819,12 +7825,6 @@
 </ct:contentTypeSchema>
 </file>
 
-<file path=customXml/item3.xml><?xml version="1.0" encoding="utf-8"?>
-<p:properties xmlns:p="http://schemas.microsoft.com/office/2006/metadata/properties" xmlns:xsi="http://www.w3.org/2001/XMLSchema-instance" xmlns:pc="http://schemas.microsoft.com/office/infopath/2007/PartnerControls">
-  <documentManagement/>
-</p:properties>
-</file>
-
 <file path=customXml/itemProps1.xml><?xml version="1.0" encoding="utf-8"?>
 <ds:datastoreItem xmlns:ds="http://schemas.openxmlformats.org/officeDocument/2006/customXml" ds:itemID="{D698FAE4-89FF-4F95-A5B0-81A4EAE56947}">
   <ds:schemaRefs>
@@ -7834,6 +7834,23 @@
 </file>
 
 <file path=customXml/itemProps2.xml><?xml version="1.0" encoding="utf-8"?>
+<ds:datastoreItem xmlns:ds="http://schemas.openxmlformats.org/officeDocument/2006/customXml" ds:itemID="{0E17CB2E-CE63-4638-AF38-D95171028394}">
+  <ds:schemaRefs>
+    <ds:schemaRef ds:uri="http://schemas.microsoft.com/office/2006/metadata/properties"/>
+    <ds:schemaRef ds:uri="http://www.w3.org/XML/1998/namespace"/>
+    <ds:schemaRef ds:uri="http://schemas.openxmlformats.org/package/2006/metadata/core-properties"/>
+    <ds:schemaRef ds:uri="http://purl.org/dc/dcmitype/"/>
+    <ds:schemaRef ds:uri="http://schemas.microsoft.com/office/2006/documentManagement/types"/>
+    <ds:schemaRef ds:uri="http://purl.org/dc/elements/1.1/"/>
+    <ds:schemaRef ds:uri="http://purl.org/dc/terms/"/>
+    <ds:schemaRef ds:uri="http://schemas.microsoft.com/office/infopath/2007/PartnerControls"/>
+    <ds:schemaRef ds:uri="8531b0eb-b9ec-4304-8fd5-4ef867e31f75"/>
+    <ds:schemaRef ds:uri="4bc5c97c-1d73-4ddd-b761-3e2b250dfd29"/>
+  </ds:schemaRefs>
+</ds:datastoreItem>
+</file>
+
+<file path=customXml/itemProps3.xml><?xml version="1.0" encoding="utf-8"?>
 <ds:datastoreItem xmlns:ds="http://schemas.openxmlformats.org/officeDocument/2006/customXml" ds:itemID="{A5FB4F0E-AFD2-4968-A353-50F4174DC7D5}">
   <ds:schemaRefs>
     <ds:schemaRef ds:uri="http://schemas.microsoft.com/office/2006/metadata/contentType"/>
@@ -7850,21 +7867,4 @@
     <ds:schemaRef ds:uri="http://schemas.microsoft.com/internal/obd"/>
   </ds:schemaRefs>
 </ds:datastoreItem>
-</file>
-
-<file path=customXml/itemProps3.xml><?xml version="1.0" encoding="utf-8"?>
-<ds:datastoreItem xmlns:ds="http://schemas.openxmlformats.org/officeDocument/2006/customXml" ds:itemID="{0E17CB2E-CE63-4638-AF38-D95171028394}">
-  <ds:schemaRefs>
-    <ds:schemaRef ds:uri="http://schemas.microsoft.com/office/2006/metadata/properties"/>
-    <ds:schemaRef ds:uri="http://www.w3.org/XML/1998/namespace"/>
-    <ds:schemaRef ds:uri="http://schemas.openxmlformats.org/package/2006/metadata/core-properties"/>
-    <ds:schemaRef ds:uri="http://purl.org/dc/dcmitype/"/>
-    <ds:schemaRef ds:uri="http://schemas.microsoft.com/office/2006/documentManagement/types"/>
-    <ds:schemaRef ds:uri="http://purl.org/dc/elements/1.1/"/>
-    <ds:schemaRef ds:uri="http://purl.org/dc/terms/"/>
-    <ds:schemaRef ds:uri="http://schemas.microsoft.com/office/infopath/2007/PartnerControls"/>
-    <ds:schemaRef ds:uri="8531b0eb-b9ec-4304-8fd5-4ef867e31f75"/>
-    <ds:schemaRef ds:uri="4bc5c97c-1d73-4ddd-b761-3e2b250dfd29"/>
-  </ds:schemaRefs>
-</ds:datastoreItem>
 </file>
</xml_diff>